<commit_message>
Final Paper and Presentation
</commit_message>
<xml_diff>
--- a/Presentation/Comp_775_Final_Presentation_SDGeorge.pptx
+++ b/Presentation/Comp_775_Final_Presentation_SDGeorge.pptx
@@ -277,7 +277,7 @@
           <a:p>
             <a:fld id="{EEBA1F01-C730-4254-A4EC-5024447B991B}" type="datetimeFigureOut">
               <a:rPr lang="en-US" smtClean="0"/>
-              <a:t>12/11/2018</a:t>
+              <a:t>12/12/2018</a:t>
             </a:fld>
             <a:endParaRPr lang="en-US"/>
           </a:p>
@@ -475,7 +475,7 @@
           <a:p>
             <a:fld id="{EEBA1F01-C730-4254-A4EC-5024447B991B}" type="datetimeFigureOut">
               <a:rPr lang="en-US" smtClean="0"/>
-              <a:t>12/11/2018</a:t>
+              <a:t>12/12/2018</a:t>
             </a:fld>
             <a:endParaRPr lang="en-US"/>
           </a:p>
@@ -683,7 +683,7 @@
           <a:p>
             <a:fld id="{EEBA1F01-C730-4254-A4EC-5024447B991B}" type="datetimeFigureOut">
               <a:rPr lang="en-US" smtClean="0"/>
-              <a:t>12/11/2018</a:t>
+              <a:t>12/12/2018</a:t>
             </a:fld>
             <a:endParaRPr lang="en-US"/>
           </a:p>
@@ -881,7 +881,7 @@
           <a:p>
             <a:fld id="{EEBA1F01-C730-4254-A4EC-5024447B991B}" type="datetimeFigureOut">
               <a:rPr lang="en-US" smtClean="0"/>
-              <a:t>12/11/2018</a:t>
+              <a:t>12/12/2018</a:t>
             </a:fld>
             <a:endParaRPr lang="en-US"/>
           </a:p>
@@ -1156,7 +1156,7 @@
           <a:p>
             <a:fld id="{EEBA1F01-C730-4254-A4EC-5024447B991B}" type="datetimeFigureOut">
               <a:rPr lang="en-US" smtClean="0"/>
-              <a:t>12/11/2018</a:t>
+              <a:t>12/12/2018</a:t>
             </a:fld>
             <a:endParaRPr lang="en-US"/>
           </a:p>
@@ -1421,7 +1421,7 @@
           <a:p>
             <a:fld id="{EEBA1F01-C730-4254-A4EC-5024447B991B}" type="datetimeFigureOut">
               <a:rPr lang="en-US" smtClean="0"/>
-              <a:t>12/11/2018</a:t>
+              <a:t>12/12/2018</a:t>
             </a:fld>
             <a:endParaRPr lang="en-US"/>
           </a:p>
@@ -1833,7 +1833,7 @@
           <a:p>
             <a:fld id="{EEBA1F01-C730-4254-A4EC-5024447B991B}" type="datetimeFigureOut">
               <a:rPr lang="en-US" smtClean="0"/>
-              <a:t>12/11/2018</a:t>
+              <a:t>12/12/2018</a:t>
             </a:fld>
             <a:endParaRPr lang="en-US"/>
           </a:p>
@@ -1974,7 +1974,7 @@
           <a:p>
             <a:fld id="{EEBA1F01-C730-4254-A4EC-5024447B991B}" type="datetimeFigureOut">
               <a:rPr lang="en-US" smtClean="0"/>
-              <a:t>12/11/2018</a:t>
+              <a:t>12/12/2018</a:t>
             </a:fld>
             <a:endParaRPr lang="en-US"/>
           </a:p>
@@ -2087,7 +2087,7 @@
           <a:p>
             <a:fld id="{EEBA1F01-C730-4254-A4EC-5024447B991B}" type="datetimeFigureOut">
               <a:rPr lang="en-US" smtClean="0"/>
-              <a:t>12/11/2018</a:t>
+              <a:t>12/12/2018</a:t>
             </a:fld>
             <a:endParaRPr lang="en-US"/>
           </a:p>
@@ -2398,7 +2398,7 @@
           <a:p>
             <a:fld id="{EEBA1F01-C730-4254-A4EC-5024447B991B}" type="datetimeFigureOut">
               <a:rPr lang="en-US" smtClean="0"/>
-              <a:t>12/11/2018</a:t>
+              <a:t>12/12/2018</a:t>
             </a:fld>
             <a:endParaRPr lang="en-US"/>
           </a:p>
@@ -2686,7 +2686,7 @@
           <a:p>
             <a:fld id="{EEBA1F01-C730-4254-A4EC-5024447B991B}" type="datetimeFigureOut">
               <a:rPr lang="en-US" smtClean="0"/>
-              <a:t>12/11/2018</a:t>
+              <a:t>12/12/2018</a:t>
             </a:fld>
             <a:endParaRPr lang="en-US"/>
           </a:p>
@@ -2927,7 +2927,7 @@
           <a:p>
             <a:fld id="{EEBA1F01-C730-4254-A4EC-5024447B991B}" type="datetimeFigureOut">
               <a:rPr lang="en-US" smtClean="0"/>
-              <a:t>12/11/2018</a:t>
+              <a:t>12/12/2018</a:t>
             </a:fld>
             <a:endParaRPr lang="en-US"/>
           </a:p>
@@ -11650,7 +11650,7 @@
           <a:lstStyle/>
           <a:p>
             <a:r>
-              <a:rPr lang="en-US" sz="2400"/>
+              <a:rPr lang="en-US" sz="2400" dirty="0"/>
               <a:t>Simply put, the goal of my project was to predict a point distribution model (PDM) that would segment the Corpus Callosum using a neural network (NN) based object detection model (ODM). This PDM would be derived entirely from the image and require no additional tuning after the prediction was made. To simplify the problem at the start I only sought to learn four key landmarks on the Corpus Callosum. From here, if this performed well, I can expand to a full PDM.</a:t>
             </a:r>
           </a:p>
@@ -11719,7 +11719,7 @@
         </p:blipFill>
         <p:spPr>
           <a:xfrm>
-            <a:off x="7056372" y="3536374"/>
+            <a:off x="7056372" y="3527748"/>
             <a:ext cx="2513831" cy="2506981"/>
           </a:xfrm>
           <a:prstGeom prst="rect">
@@ -11745,7 +11745,7 @@
         <p:spPr>
           <a:xfrm>
             <a:off x="4800600" y="4755574"/>
-            <a:ext cx="2255772" cy="34291"/>
+            <a:ext cx="2255772" cy="25665"/>
           </a:xfrm>
           <a:prstGeom prst="straightConnector1">
             <a:avLst/>
@@ -11944,7 +11944,7 @@
             <a:pPr lvl="2"/>
             <a:r>
               <a:rPr lang="en-US" sz="1600" dirty="0"/>
-              <a:t>A network that has already been trained to recognize image structures may vastly improve performance with less training images. This may alleviate our need for the thousands of images usually required for an accurate object detection task.</a:t>
+              <a:t>A network that has already been trained to recognize image structures may vastly improve performance with less training images. This may alleviate our need for the thousands of images usually required for an object detection task.</a:t>
             </a:r>
           </a:p>
           <a:p>
@@ -14255,9 +14255,10 @@
           <a:lstStyle/>
           <a:p>
             <a:r>
-              <a:rPr lang="en-US" dirty="0"/>
-              <a:t>Final Feature Layer:</a:t>
-            </a:r>
+              <a:rPr lang="en-US"/>
+              <a:t>Overlayer:</a:t>
+            </a:r>
+            <a:endParaRPr lang="en-US" dirty="0"/>
           </a:p>
           <a:p>
             <a:r>

</xml_diff>